<commit_message>
update: widget, file tree
</commit_message>
<xml_diff>
--- a/qt_guan_dan/dev_ui_sketch.pptx
+++ b/qt_guan_dan/dev_ui_sketch.pptx
@@ -3793,264 +3793,309 @@
           <a:chExt cx="0" cy="0"/>
         </a:xfrm>
       </p:grpSpPr>
-      <p:sp>
-        <p:nvSpPr>
-          <p:cNvPr id="17" name="Rectangle: Rounded Corners 16">
-            <a:extLst>
-              <a:ext uri="{FF2B5EF4-FFF2-40B4-BE49-F238E27FC236}">
-                <a16:creationId xmlns:a16="http://schemas.microsoft.com/office/drawing/2014/main" id="{197BD189-7D8F-959B-1A25-72923142DC46}"/>
-              </a:ext>
-            </a:extLst>
-          </p:cNvPr>
-          <p:cNvSpPr/>
+      <p:grpSp>
+        <p:nvGrpSpPr>
+          <p:cNvPr id="2" name="Group 1">
+            <a:extLst>
+              <a:ext uri="{FF2B5EF4-FFF2-40B4-BE49-F238E27FC236}">
+                <a16:creationId xmlns:a16="http://schemas.microsoft.com/office/drawing/2014/main" id="{0CE90292-0ECA-E142-92EE-19B8C56AE8FD}"/>
+              </a:ext>
+            </a:extLst>
+          </p:cNvPr>
+          <p:cNvGrpSpPr/>
           <p:nvPr/>
-        </p:nvSpPr>
-        <p:spPr>
+        </p:nvGrpSpPr>
+        <p:grpSpPr>
           <a:xfrm>
-            <a:off x="664041" y="177632"/>
-            <a:ext cx="680576" cy="369332"/>
+            <a:off x="204452" y="171906"/>
+            <a:ext cx="1140165" cy="838354"/>
+            <a:chOff x="204452" y="171906"/>
+            <a:chExt cx="1140165" cy="838354"/>
           </a:xfrm>
-          <a:prstGeom prst="roundRect">
-            <a:avLst>
-              <a:gd name="adj" fmla="val 5756"/>
-            </a:avLst>
-          </a:prstGeom>
-          <a:solidFill>
-            <a:srgbClr val="FFFFD9"/>
-          </a:solidFill>
-          <a:ln w="38100">
-            <a:noFill/>
-          </a:ln>
-          <a:effectLst>
-            <a:outerShdw blurRad="50800" dist="38100" dir="2700000" algn="tl" rotWithShape="0">
-              <a:prstClr val="black">
-                <a:alpha val="40000"/>
-              </a:prstClr>
-            </a:outerShdw>
-          </a:effectLst>
-        </p:spPr>
-        <p:style>
-          <a:lnRef idx="2">
-            <a:schemeClr val="accent1">
-              <a:shade val="50000"/>
-            </a:schemeClr>
-          </a:lnRef>
-          <a:fillRef idx="1">
-            <a:schemeClr val="accent1"/>
-          </a:fillRef>
-          <a:effectRef idx="0">
-            <a:schemeClr val="accent1"/>
-          </a:effectRef>
-          <a:fontRef idx="minor">
-            <a:schemeClr val="lt1"/>
-          </a:fontRef>
-        </p:style>
-        <p:txBody>
-          <a:bodyPr rtlCol="0" anchor="ctr"/>
-          <a:lstStyle/>
-          <a:p>
-            <a:pPr marL="0" marR="0" lvl="0" indent="0" algn="ctr" defTabSz="914400" rtl="0" eaLnBrk="1" fontAlgn="auto" latinLnBrk="0" hangingPunct="1">
-              <a:lnSpc>
-                <a:spcPct val="100000"/>
-              </a:lnSpc>
-              <a:spcBef>
-                <a:spcPts val="0"/>
-              </a:spcBef>
-              <a:spcAft>
-                <a:spcPts val="0"/>
-              </a:spcAft>
-              <a:buClrTx/>
-              <a:buSzTx/>
-              <a:buFontTx/>
-              <a:buNone/>
-              <a:tabLst/>
-              <a:defRPr/>
-            </a:pPr>
-            <a:endParaRPr kumimoji="0" lang="en-US" altLang="zh-CN" b="1" i="0" u="none" strike="noStrike" kern="1200" cap="none" spc="0" normalizeH="0" baseline="0" noProof="0">
-              <a:ln>
-                <a:noFill/>
-              </a:ln>
-              <a:solidFill>
-                <a:prstClr val="white"/>
-              </a:solidFill>
-              <a:effectLst/>
-              <a:uLnTx/>
-              <a:uFillTx/>
-              <a:latin typeface="等线" panose="020F0502020204030204"/>
-              <a:ea typeface="等线" panose="02010600030101010101" pitchFamily="2" charset="-122"/>
-              <a:cs typeface="+mn-cs"/>
-            </a:endParaRPr>
-          </a:p>
-        </p:txBody>
-      </p:sp>
-      <p:sp>
-        <p:nvSpPr>
-          <p:cNvPr id="18" name="Rectangle: Rounded Corners 17">
-            <a:extLst>
-              <a:ext uri="{FF2B5EF4-FFF2-40B4-BE49-F238E27FC236}">
-                <a16:creationId xmlns:a16="http://schemas.microsoft.com/office/drawing/2014/main" id="{40969952-992A-9E66-EA53-7A742E4F335F}"/>
-              </a:ext>
-            </a:extLst>
-          </p:cNvPr>
-          <p:cNvSpPr/>
-          <p:nvPr/>
-        </p:nvSpPr>
-        <p:spPr>
-          <a:xfrm>
-            <a:off x="686227" y="640928"/>
-            <a:ext cx="658390" cy="369332"/>
-          </a:xfrm>
-          <a:prstGeom prst="roundRect">
-            <a:avLst>
-              <a:gd name="adj" fmla="val 5756"/>
-            </a:avLst>
-          </a:prstGeom>
-          <a:solidFill>
-            <a:srgbClr val="FFFFD9"/>
-          </a:solidFill>
-          <a:ln w="38100">
-            <a:noFill/>
-          </a:ln>
-          <a:effectLst>
-            <a:outerShdw blurRad="50800" dist="38100" dir="2700000" algn="tl" rotWithShape="0">
-              <a:prstClr val="black">
-                <a:alpha val="40000"/>
-              </a:prstClr>
-            </a:outerShdw>
-          </a:effectLst>
-        </p:spPr>
-        <p:style>
-          <a:lnRef idx="2">
-            <a:schemeClr val="accent1">
-              <a:shade val="50000"/>
-            </a:schemeClr>
-          </a:lnRef>
-          <a:fillRef idx="1">
-            <a:schemeClr val="accent1"/>
-          </a:fillRef>
-          <a:effectRef idx="0">
-            <a:schemeClr val="accent1"/>
-          </a:effectRef>
-          <a:fontRef idx="minor">
-            <a:schemeClr val="lt1"/>
-          </a:fontRef>
-        </p:style>
-        <p:txBody>
-          <a:bodyPr rtlCol="0" anchor="ctr"/>
-          <a:lstStyle/>
-          <a:p>
-            <a:pPr marL="0" marR="0" lvl="0" indent="0" algn="ctr" defTabSz="914400" rtl="0" eaLnBrk="1" fontAlgn="auto" latinLnBrk="0" hangingPunct="1">
-              <a:lnSpc>
-                <a:spcPct val="100000"/>
-              </a:lnSpc>
-              <a:spcBef>
-                <a:spcPts val="0"/>
-              </a:spcBef>
-              <a:spcAft>
-                <a:spcPts val="0"/>
-              </a:spcAft>
-              <a:buClrTx/>
-              <a:buSzTx/>
-              <a:buFontTx/>
-              <a:buNone/>
-              <a:tabLst/>
-              <a:defRPr/>
-            </a:pPr>
-            <a:endParaRPr kumimoji="0" lang="en-US" altLang="zh-CN" b="1" i="0" u="none" strike="noStrike" kern="1200" cap="none" spc="0" normalizeH="0" baseline="0" noProof="0">
-              <a:ln>
-                <a:noFill/>
-              </a:ln>
-              <a:solidFill>
-                <a:prstClr val="white"/>
-              </a:solidFill>
-              <a:effectLst/>
-              <a:uLnTx/>
-              <a:uFillTx/>
-              <a:latin typeface="等线" panose="020F0502020204030204"/>
-              <a:ea typeface="等线" panose="02010600030101010101" pitchFamily="2" charset="-122"/>
-              <a:cs typeface="+mn-cs"/>
-            </a:endParaRPr>
-          </a:p>
-        </p:txBody>
-      </p:sp>
-      <p:sp>
-        <p:nvSpPr>
-          <p:cNvPr id="13" name="Rectangle: Rounded Corners 12">
-            <a:extLst>
-              <a:ext uri="{FF2B5EF4-FFF2-40B4-BE49-F238E27FC236}">
-                <a16:creationId xmlns:a16="http://schemas.microsoft.com/office/drawing/2014/main" id="{F49E50A9-09F0-6405-0947-26A292CD792E}"/>
-              </a:ext>
-            </a:extLst>
-          </p:cNvPr>
-          <p:cNvSpPr/>
-          <p:nvPr/>
-        </p:nvSpPr>
-        <p:spPr>
-          <a:xfrm>
-            <a:off x="212087" y="177632"/>
-            <a:ext cx="632634" cy="369332"/>
-          </a:xfrm>
-          <a:prstGeom prst="roundRect">
-            <a:avLst>
-              <a:gd name="adj" fmla="val 5756"/>
-            </a:avLst>
-          </a:prstGeom>
-          <a:solidFill>
-            <a:schemeClr val="accent6">
-              <a:lumMod val="60000"/>
-              <a:lumOff val="40000"/>
-            </a:schemeClr>
-          </a:solidFill>
-          <a:ln w="38100">
-            <a:noFill/>
-          </a:ln>
-          <a:effectLst>
-            <a:outerShdw blurRad="50800" dist="38100" dir="2700000" algn="tl" rotWithShape="0">
-              <a:prstClr val="black">
-                <a:alpha val="40000"/>
-              </a:prstClr>
-            </a:outerShdw>
-          </a:effectLst>
-        </p:spPr>
-        <p:style>
-          <a:lnRef idx="2">
-            <a:schemeClr val="accent1">
-              <a:shade val="50000"/>
-            </a:schemeClr>
-          </a:lnRef>
-          <a:fillRef idx="1">
-            <a:schemeClr val="accent1"/>
-          </a:fillRef>
-          <a:effectRef idx="0">
-            <a:schemeClr val="accent1"/>
-          </a:effectRef>
-          <a:fontRef idx="minor">
-            <a:schemeClr val="lt1"/>
-          </a:fontRef>
-        </p:style>
-        <p:txBody>
-          <a:bodyPr rtlCol="0" anchor="ctr"/>
-          <a:lstStyle/>
-          <a:p>
-            <a:pPr marL="0" marR="0" lvl="0" indent="0" algn="ctr" defTabSz="914400" rtl="0" eaLnBrk="1" fontAlgn="auto" latinLnBrk="0" hangingPunct="1">
-              <a:lnSpc>
-                <a:spcPct val="100000"/>
-              </a:lnSpc>
-              <a:spcBef>
-                <a:spcPts val="0"/>
-              </a:spcBef>
-              <a:spcAft>
-                <a:spcPts val="0"/>
-              </a:spcAft>
-              <a:buClrTx/>
-              <a:buSzTx/>
-              <a:buFontTx/>
-              <a:buNone/>
-              <a:tabLst/>
-              <a:defRPr/>
-            </a:pPr>
-            <a:r>
-              <a:rPr kumimoji="0" lang="zh-CN" altLang="en-US" sz="1600" i="0" u="none" strike="noStrike" kern="1200" cap="none" spc="0" normalizeH="0" baseline="0" noProof="0">
+        </p:grpSpPr>
+        <p:sp>
+          <p:nvSpPr>
+            <p:cNvPr id="17" name="Rectangle: Rounded Corners 16">
+              <a:extLst>
+                <a:ext uri="{FF2B5EF4-FFF2-40B4-BE49-F238E27FC236}">
+                  <a16:creationId xmlns:a16="http://schemas.microsoft.com/office/drawing/2014/main" id="{197BD189-7D8F-959B-1A25-72923142DC46}"/>
+                </a:ext>
+              </a:extLst>
+            </p:cNvPr>
+            <p:cNvSpPr/>
+            <p:nvPr/>
+          </p:nvSpPr>
+          <p:spPr>
+            <a:xfrm>
+              <a:off x="664041" y="177632"/>
+              <a:ext cx="680576" cy="369332"/>
+            </a:xfrm>
+            <a:prstGeom prst="roundRect">
+              <a:avLst>
+                <a:gd name="adj" fmla="val 5756"/>
+              </a:avLst>
+            </a:prstGeom>
+            <a:solidFill>
+              <a:srgbClr val="FFFFD9"/>
+            </a:solidFill>
+            <a:ln w="38100">
+              <a:noFill/>
+            </a:ln>
+            <a:effectLst>
+              <a:outerShdw blurRad="50800" dist="38100" dir="2700000" algn="tl" rotWithShape="0">
+                <a:prstClr val="black">
+                  <a:alpha val="40000"/>
+                </a:prstClr>
+              </a:outerShdw>
+            </a:effectLst>
+          </p:spPr>
+          <p:style>
+            <a:lnRef idx="2">
+              <a:schemeClr val="accent1">
+                <a:shade val="50000"/>
+              </a:schemeClr>
+            </a:lnRef>
+            <a:fillRef idx="1">
+              <a:schemeClr val="accent1"/>
+            </a:fillRef>
+            <a:effectRef idx="0">
+              <a:schemeClr val="accent1"/>
+            </a:effectRef>
+            <a:fontRef idx="minor">
+              <a:schemeClr val="lt1"/>
+            </a:fontRef>
+          </p:style>
+          <p:txBody>
+            <a:bodyPr rtlCol="0" anchor="ctr"/>
+            <a:lstStyle/>
+            <a:p>
+              <a:pPr marL="0" marR="0" lvl="0" indent="0" algn="ctr" defTabSz="914400" rtl="0" eaLnBrk="1" fontAlgn="auto" latinLnBrk="0" hangingPunct="1">
+                <a:lnSpc>
+                  <a:spcPct val="100000"/>
+                </a:lnSpc>
+                <a:spcBef>
+                  <a:spcPts val="0"/>
+                </a:spcBef>
+                <a:spcAft>
+                  <a:spcPts val="0"/>
+                </a:spcAft>
+                <a:buClrTx/>
+                <a:buSzTx/>
+                <a:buFontTx/>
+                <a:buNone/>
+                <a:tabLst/>
+                <a:defRPr/>
+              </a:pPr>
+              <a:endParaRPr kumimoji="0" lang="en-US" altLang="zh-CN" b="1" i="0" u="none" strike="noStrike" kern="1200" cap="none" spc="0" normalizeH="0" baseline="0" noProof="0">
+                <a:ln>
+                  <a:noFill/>
+                </a:ln>
+                <a:solidFill>
+                  <a:prstClr val="white"/>
+                </a:solidFill>
+                <a:effectLst/>
+                <a:uLnTx/>
+                <a:uFillTx/>
+                <a:latin typeface="等线" panose="020F0502020204030204"/>
+                <a:ea typeface="等线" panose="02010600030101010101" pitchFamily="2" charset="-122"/>
+                <a:cs typeface="+mn-cs"/>
+              </a:endParaRPr>
+            </a:p>
+          </p:txBody>
+        </p:sp>
+        <p:sp>
+          <p:nvSpPr>
+            <p:cNvPr id="18" name="Rectangle: Rounded Corners 17">
+              <a:extLst>
+                <a:ext uri="{FF2B5EF4-FFF2-40B4-BE49-F238E27FC236}">
+                  <a16:creationId xmlns:a16="http://schemas.microsoft.com/office/drawing/2014/main" id="{40969952-992A-9E66-EA53-7A742E4F335F}"/>
+                </a:ext>
+              </a:extLst>
+            </p:cNvPr>
+            <p:cNvSpPr/>
+            <p:nvPr/>
+          </p:nvSpPr>
+          <p:spPr>
+            <a:xfrm>
+              <a:off x="686227" y="640928"/>
+              <a:ext cx="658390" cy="369332"/>
+            </a:xfrm>
+            <a:prstGeom prst="roundRect">
+              <a:avLst>
+                <a:gd name="adj" fmla="val 5756"/>
+              </a:avLst>
+            </a:prstGeom>
+            <a:solidFill>
+              <a:srgbClr val="FFFFD9"/>
+            </a:solidFill>
+            <a:ln w="38100">
+              <a:noFill/>
+            </a:ln>
+            <a:effectLst>
+              <a:outerShdw blurRad="50800" dist="38100" dir="2700000" algn="tl" rotWithShape="0">
+                <a:prstClr val="black">
+                  <a:alpha val="40000"/>
+                </a:prstClr>
+              </a:outerShdw>
+            </a:effectLst>
+          </p:spPr>
+          <p:style>
+            <a:lnRef idx="2">
+              <a:schemeClr val="accent1">
+                <a:shade val="50000"/>
+              </a:schemeClr>
+            </a:lnRef>
+            <a:fillRef idx="1">
+              <a:schemeClr val="accent1"/>
+            </a:fillRef>
+            <a:effectRef idx="0">
+              <a:schemeClr val="accent1"/>
+            </a:effectRef>
+            <a:fontRef idx="minor">
+              <a:schemeClr val="lt1"/>
+            </a:fontRef>
+          </p:style>
+          <p:txBody>
+            <a:bodyPr rtlCol="0" anchor="ctr"/>
+            <a:lstStyle/>
+            <a:p>
+              <a:pPr marL="0" marR="0" lvl="0" indent="0" algn="ctr" defTabSz="914400" rtl="0" eaLnBrk="1" fontAlgn="auto" latinLnBrk="0" hangingPunct="1">
+                <a:lnSpc>
+                  <a:spcPct val="100000"/>
+                </a:lnSpc>
+                <a:spcBef>
+                  <a:spcPts val="0"/>
+                </a:spcBef>
+                <a:spcAft>
+                  <a:spcPts val="0"/>
+                </a:spcAft>
+                <a:buClrTx/>
+                <a:buSzTx/>
+                <a:buFontTx/>
+                <a:buNone/>
+                <a:tabLst/>
+                <a:defRPr/>
+              </a:pPr>
+              <a:endParaRPr kumimoji="0" lang="en-US" altLang="zh-CN" b="1" i="0" u="none" strike="noStrike" kern="1200" cap="none" spc="0" normalizeH="0" baseline="0" noProof="0">
+                <a:ln>
+                  <a:noFill/>
+                </a:ln>
+                <a:solidFill>
+                  <a:prstClr val="white"/>
+                </a:solidFill>
+                <a:effectLst/>
+                <a:uLnTx/>
+                <a:uFillTx/>
+                <a:latin typeface="等线" panose="020F0502020204030204"/>
+                <a:ea typeface="等线" panose="02010600030101010101" pitchFamily="2" charset="-122"/>
+                <a:cs typeface="+mn-cs"/>
+              </a:endParaRPr>
+            </a:p>
+          </p:txBody>
+        </p:sp>
+        <p:sp>
+          <p:nvSpPr>
+            <p:cNvPr id="13" name="Rectangle: Rounded Corners 12">
+              <a:extLst>
+                <a:ext uri="{FF2B5EF4-FFF2-40B4-BE49-F238E27FC236}">
+                  <a16:creationId xmlns:a16="http://schemas.microsoft.com/office/drawing/2014/main" id="{F49E50A9-09F0-6405-0947-26A292CD792E}"/>
+                </a:ext>
+              </a:extLst>
+            </p:cNvPr>
+            <p:cNvSpPr/>
+            <p:nvPr/>
+          </p:nvSpPr>
+          <p:spPr>
+            <a:xfrm>
+              <a:off x="212087" y="634832"/>
+              <a:ext cx="632634" cy="369332"/>
+            </a:xfrm>
+            <a:prstGeom prst="roundRect">
+              <a:avLst>
+                <a:gd name="adj" fmla="val 5756"/>
+              </a:avLst>
+            </a:prstGeom>
+            <a:solidFill>
+              <a:schemeClr val="accent6">
+                <a:lumMod val="60000"/>
+                <a:lumOff val="40000"/>
+              </a:schemeClr>
+            </a:solidFill>
+            <a:ln w="38100">
+              <a:noFill/>
+            </a:ln>
+            <a:effectLst>
+              <a:outerShdw blurRad="50800" dist="38100" dir="2700000" algn="tl" rotWithShape="0">
+                <a:prstClr val="black">
+                  <a:alpha val="40000"/>
+                </a:prstClr>
+              </a:outerShdw>
+            </a:effectLst>
+          </p:spPr>
+          <p:style>
+            <a:lnRef idx="2">
+              <a:schemeClr val="accent1">
+                <a:shade val="50000"/>
+              </a:schemeClr>
+            </a:lnRef>
+            <a:fillRef idx="1">
+              <a:schemeClr val="accent1"/>
+            </a:fillRef>
+            <a:effectRef idx="0">
+              <a:schemeClr val="accent1"/>
+            </a:effectRef>
+            <a:fontRef idx="minor">
+              <a:schemeClr val="lt1"/>
+            </a:fontRef>
+          </p:style>
+          <p:txBody>
+            <a:bodyPr rtlCol="0" anchor="ctr"/>
+            <a:lstStyle/>
+            <a:p>
+              <a:pPr marL="0" marR="0" lvl="0" indent="0" algn="ctr" defTabSz="914400" rtl="0" eaLnBrk="1" fontAlgn="auto" latinLnBrk="0" hangingPunct="1">
+                <a:lnSpc>
+                  <a:spcPct val="100000"/>
+                </a:lnSpc>
+                <a:spcBef>
+                  <a:spcPts val="0"/>
+                </a:spcBef>
+                <a:spcAft>
+                  <a:spcPts val="0"/>
+                </a:spcAft>
+                <a:buClrTx/>
+                <a:buSzTx/>
+                <a:buFontTx/>
+                <a:buNone/>
+                <a:tabLst/>
+                <a:defRPr/>
+              </a:pPr>
+              <a:r>
+                <a:rPr lang="zh-CN" altLang="en-US" sz="1600">
+                  <a:solidFill>
+                    <a:schemeClr val="tx1"/>
+                  </a:solidFill>
+                  <a:latin typeface="微软雅黑" panose="020B0503020204020204" pitchFamily="34" charset="-122"/>
+                  <a:ea typeface="微软雅黑" panose="020B0503020204020204" pitchFamily="34" charset="-122"/>
+                </a:rPr>
+                <a:t>对</a:t>
+              </a:r>
+              <a:r>
+                <a:rPr kumimoji="0" lang="zh-CN" altLang="en-US" sz="1600" i="0" u="none" strike="noStrike" kern="1200" cap="none" spc="0" normalizeH="0" baseline="0" noProof="0">
+                  <a:ln>
+                    <a:noFill/>
+                  </a:ln>
+                  <a:solidFill>
+                    <a:schemeClr val="tx1"/>
+                  </a:solidFill>
+                  <a:effectLst/>
+                  <a:uLnTx/>
+                  <a:uFillTx/>
+                  <a:latin typeface="微软雅黑" panose="020B0503020204020204" pitchFamily="34" charset="-122"/>
+                  <a:ea typeface="微软雅黑" panose="020B0503020204020204" pitchFamily="34" charset="-122"/>
+                </a:rPr>
+                <a:t>方</a:t>
+              </a:r>
+              <a:endParaRPr kumimoji="0" lang="en-US" altLang="zh-CN" sz="1600" i="0" u="none" strike="noStrike" kern="1200" cap="none" spc="0" normalizeH="0" baseline="0" noProof="0">
                 <a:ln>
                   <a:noFill/>
                 </a:ln>
@@ -4062,113 +4107,103 @@
                 <a:uFillTx/>
                 <a:latin typeface="微软雅黑" panose="020B0503020204020204" pitchFamily="34" charset="-122"/>
                 <a:ea typeface="微软雅黑" panose="020B0503020204020204" pitchFamily="34" charset="-122"/>
-              </a:rPr>
-              <a:t>己方</a:t>
-            </a:r>
-            <a:endParaRPr kumimoji="0" lang="en-US" altLang="zh-CN" sz="1600" i="0" u="none" strike="noStrike" kern="1200" cap="none" spc="0" normalizeH="0" baseline="0" noProof="0">
-              <a:ln>
-                <a:noFill/>
-              </a:ln>
-              <a:solidFill>
-                <a:schemeClr val="tx1"/>
-              </a:solidFill>
-              <a:effectLst/>
-              <a:uLnTx/>
-              <a:uFillTx/>
-              <a:latin typeface="微软雅黑" panose="020B0503020204020204" pitchFamily="34" charset="-122"/>
-              <a:ea typeface="微软雅黑" panose="020B0503020204020204" pitchFamily="34" charset="-122"/>
-            </a:endParaRPr>
-          </a:p>
-        </p:txBody>
-      </p:sp>
-      <p:sp>
-        <p:nvSpPr>
-          <p:cNvPr id="15" name="Rectangle: Rounded Corners 14">
-            <a:extLst>
-              <a:ext uri="{FF2B5EF4-FFF2-40B4-BE49-F238E27FC236}">
-                <a16:creationId xmlns:a16="http://schemas.microsoft.com/office/drawing/2014/main" id="{50A81C3E-C276-416B-2EC3-DCE8D0434E37}"/>
-              </a:ext>
-            </a:extLst>
-          </p:cNvPr>
-          <p:cNvSpPr/>
-          <p:nvPr/>
-        </p:nvSpPr>
-        <p:spPr>
-          <a:xfrm>
-            <a:off x="212087" y="640928"/>
-            <a:ext cx="632634" cy="369332"/>
-          </a:xfrm>
-          <a:prstGeom prst="roundRect">
-            <a:avLst>
-              <a:gd name="adj" fmla="val 5756"/>
-            </a:avLst>
-          </a:prstGeom>
-          <a:solidFill>
-            <a:schemeClr val="accent1">
-              <a:lumMod val="60000"/>
-              <a:lumOff val="40000"/>
-            </a:schemeClr>
-          </a:solidFill>
-          <a:ln w="38100">
-            <a:noFill/>
-          </a:ln>
-          <a:effectLst>
-            <a:outerShdw blurRad="50800" dist="38100" dir="2700000" algn="tl" rotWithShape="0">
-              <a:prstClr val="black">
-                <a:alpha val="40000"/>
-              </a:prstClr>
-            </a:outerShdw>
-          </a:effectLst>
-        </p:spPr>
-        <p:style>
-          <a:lnRef idx="2">
-            <a:schemeClr val="accent1">
-              <a:shade val="50000"/>
-            </a:schemeClr>
-          </a:lnRef>
-          <a:fillRef idx="1">
-            <a:schemeClr val="accent1"/>
-          </a:fillRef>
-          <a:effectRef idx="0">
-            <a:schemeClr val="accent1"/>
-          </a:effectRef>
-          <a:fontRef idx="minor">
-            <a:schemeClr val="lt1"/>
-          </a:fontRef>
-        </p:style>
-        <p:txBody>
-          <a:bodyPr rtlCol="0" anchor="ctr"/>
-          <a:lstStyle/>
-          <a:p>
-            <a:pPr marL="0" marR="0" lvl="0" indent="0" algn="ctr" defTabSz="914400" rtl="0" eaLnBrk="1" fontAlgn="auto" latinLnBrk="0" hangingPunct="1">
-              <a:lnSpc>
-                <a:spcPct val="100000"/>
-              </a:lnSpc>
-              <a:spcBef>
-                <a:spcPts val="0"/>
-              </a:spcBef>
-              <a:spcAft>
-                <a:spcPts val="0"/>
-              </a:spcAft>
-              <a:buClrTx/>
-              <a:buSzTx/>
-              <a:buFontTx/>
-              <a:buNone/>
-              <a:tabLst/>
-              <a:defRPr/>
-            </a:pPr>
-            <a:r>
-              <a:rPr lang="zh-CN" altLang="en-US" sz="1600">
-                <a:solidFill>
-                  <a:schemeClr val="tx1"/>
-                </a:solidFill>
-                <a:latin typeface="微软雅黑" panose="020B0503020204020204" pitchFamily="34" charset="-122"/>
-                <a:ea typeface="微软雅黑" panose="020B0503020204020204" pitchFamily="34" charset="-122"/>
-              </a:rPr>
-              <a:t>对</a:t>
-            </a:r>
-            <a:r>
-              <a:rPr kumimoji="0" lang="zh-CN" altLang="en-US" sz="1600" i="0" u="none" strike="noStrike" kern="1200" cap="none" spc="0" normalizeH="0" baseline="0" noProof="0">
+              </a:endParaRPr>
+            </a:p>
+          </p:txBody>
+        </p:sp>
+        <p:sp>
+          <p:nvSpPr>
+            <p:cNvPr id="15" name="Rectangle: Rounded Corners 14">
+              <a:extLst>
+                <a:ext uri="{FF2B5EF4-FFF2-40B4-BE49-F238E27FC236}">
+                  <a16:creationId xmlns:a16="http://schemas.microsoft.com/office/drawing/2014/main" id="{50A81C3E-C276-416B-2EC3-DCE8D0434E37}"/>
+                </a:ext>
+              </a:extLst>
+            </p:cNvPr>
+            <p:cNvSpPr/>
+            <p:nvPr/>
+          </p:nvSpPr>
+          <p:spPr>
+            <a:xfrm>
+              <a:off x="204452" y="171906"/>
+              <a:ext cx="632634" cy="381153"/>
+            </a:xfrm>
+            <a:prstGeom prst="roundRect">
+              <a:avLst>
+                <a:gd name="adj" fmla="val 5756"/>
+              </a:avLst>
+            </a:prstGeom>
+            <a:solidFill>
+              <a:schemeClr val="accent1">
+                <a:lumMod val="60000"/>
+                <a:lumOff val="40000"/>
+              </a:schemeClr>
+            </a:solidFill>
+            <a:ln w="38100">
+              <a:noFill/>
+            </a:ln>
+            <a:effectLst>
+              <a:outerShdw blurRad="50800" dist="38100" dir="2700000" algn="tl" rotWithShape="0">
+                <a:prstClr val="black">
+                  <a:alpha val="40000"/>
+                </a:prstClr>
+              </a:outerShdw>
+            </a:effectLst>
+          </p:spPr>
+          <p:style>
+            <a:lnRef idx="2">
+              <a:schemeClr val="accent1">
+                <a:shade val="50000"/>
+              </a:schemeClr>
+            </a:lnRef>
+            <a:fillRef idx="1">
+              <a:schemeClr val="accent1"/>
+            </a:fillRef>
+            <a:effectRef idx="0">
+              <a:schemeClr val="accent1"/>
+            </a:effectRef>
+            <a:fontRef idx="minor">
+              <a:schemeClr val="lt1"/>
+            </a:fontRef>
+          </p:style>
+          <p:txBody>
+            <a:bodyPr rtlCol="0" anchor="ctr"/>
+            <a:lstStyle/>
+            <a:p>
+              <a:pPr marL="0" marR="0" lvl="0" indent="0" algn="ctr" defTabSz="914400" rtl="0" eaLnBrk="1" fontAlgn="auto" latinLnBrk="0" hangingPunct="1">
+                <a:lnSpc>
+                  <a:spcPct val="100000"/>
+                </a:lnSpc>
+                <a:spcBef>
+                  <a:spcPts val="0"/>
+                </a:spcBef>
+                <a:spcAft>
+                  <a:spcPts val="0"/>
+                </a:spcAft>
+                <a:buClrTx/>
+                <a:buSzTx/>
+                <a:buFontTx/>
+                <a:buNone/>
+                <a:tabLst/>
+                <a:defRPr/>
+              </a:pPr>
+              <a:r>
+                <a:rPr kumimoji="0" lang="zh-CN" altLang="en-US" sz="1600" i="0" u="none" strike="noStrike" kern="1200" cap="none" spc="0" normalizeH="0" baseline="0" noProof="0">
+                  <a:ln>
+                    <a:noFill/>
+                  </a:ln>
+                  <a:solidFill>
+                    <a:schemeClr val="tx1"/>
+                  </a:solidFill>
+                  <a:effectLst/>
+                  <a:uLnTx/>
+                  <a:uFillTx/>
+                  <a:latin typeface="微软雅黑" panose="020B0503020204020204" pitchFamily="34" charset="-122"/>
+                  <a:ea typeface="微软雅黑" panose="020B0503020204020204" pitchFamily="34" charset="-122"/>
+                </a:rPr>
+                <a:t>己方</a:t>
+              </a:r>
+              <a:endParaRPr kumimoji="0" lang="en-US" altLang="zh-CN" sz="1600" i="0" u="none" strike="noStrike" kern="1200" cap="none" spc="0" normalizeH="0" baseline="0" noProof="0">
                 <a:ln>
                   <a:noFill/>
                 </a:ln>
@@ -4180,25 +4215,11 @@
                 <a:uFillTx/>
                 <a:latin typeface="微软雅黑" panose="020B0503020204020204" pitchFamily="34" charset="-122"/>
                 <a:ea typeface="微软雅黑" panose="020B0503020204020204" pitchFamily="34" charset="-122"/>
-              </a:rPr>
-              <a:t>方</a:t>
-            </a:r>
-            <a:endParaRPr kumimoji="0" lang="en-US" altLang="zh-CN" sz="1600" i="0" u="none" strike="noStrike" kern="1200" cap="none" spc="0" normalizeH="0" baseline="0" noProof="0">
-              <a:ln>
-                <a:noFill/>
-              </a:ln>
-              <a:solidFill>
-                <a:schemeClr val="tx1"/>
-              </a:solidFill>
-              <a:effectLst/>
-              <a:uLnTx/>
-              <a:uFillTx/>
-              <a:latin typeface="微软雅黑" panose="020B0503020204020204" pitchFamily="34" charset="-122"/>
-              <a:ea typeface="微软雅黑" panose="020B0503020204020204" pitchFamily="34" charset="-122"/>
-            </a:endParaRPr>
-          </a:p>
-        </p:txBody>
-      </p:sp>
+              </a:endParaRPr>
+            </a:p>
+          </p:txBody>
+        </p:sp>
+      </p:grpSp>
       <p:grpSp>
         <p:nvGrpSpPr>
           <p:cNvPr id="96" name="Group 95">

</xml_diff>

<commit_message>
update: rsc; add: btn ui
</commit_message>
<xml_diff>
--- a/qt_guan_dan/dev_ui_sketch.pptx
+++ b/qt_guan_dan/dev_ui_sketch.pptx
@@ -262,7 +262,7 @@
           <a:p>
             <a:fld id="{6E86E93E-9FC2-4E2D-B23B-44D3A41FB4D3}" type="datetimeFigureOut">
               <a:rPr lang="zh-CN" altLang="en-US" smtClean="0"/>
-              <a:t>2023/4/30</a:t>
+              <a:t>2023/5/1</a:t>
             </a:fld>
             <a:endParaRPr lang="zh-CN" altLang="en-US"/>
           </a:p>
@@ -462,7 +462,7 @@
           <a:p>
             <a:fld id="{6E86E93E-9FC2-4E2D-B23B-44D3A41FB4D3}" type="datetimeFigureOut">
               <a:rPr lang="zh-CN" altLang="en-US" smtClean="0"/>
-              <a:t>2023/4/30</a:t>
+              <a:t>2023/5/1</a:t>
             </a:fld>
             <a:endParaRPr lang="zh-CN" altLang="en-US"/>
           </a:p>
@@ -672,7 +672,7 @@
           <a:p>
             <a:fld id="{6E86E93E-9FC2-4E2D-B23B-44D3A41FB4D3}" type="datetimeFigureOut">
               <a:rPr lang="zh-CN" altLang="en-US" smtClean="0"/>
-              <a:t>2023/4/30</a:t>
+              <a:t>2023/5/1</a:t>
             </a:fld>
             <a:endParaRPr lang="zh-CN" altLang="en-US"/>
           </a:p>
@@ -872,7 +872,7 @@
           <a:p>
             <a:fld id="{6E86E93E-9FC2-4E2D-B23B-44D3A41FB4D3}" type="datetimeFigureOut">
               <a:rPr lang="zh-CN" altLang="en-US" smtClean="0"/>
-              <a:t>2023/4/30</a:t>
+              <a:t>2023/5/1</a:t>
             </a:fld>
             <a:endParaRPr lang="zh-CN" altLang="en-US"/>
           </a:p>
@@ -1148,7 +1148,7 @@
           <a:p>
             <a:fld id="{6E86E93E-9FC2-4E2D-B23B-44D3A41FB4D3}" type="datetimeFigureOut">
               <a:rPr lang="zh-CN" altLang="en-US" smtClean="0"/>
-              <a:t>2023/4/30</a:t>
+              <a:t>2023/5/1</a:t>
             </a:fld>
             <a:endParaRPr lang="zh-CN" altLang="en-US"/>
           </a:p>
@@ -1416,7 +1416,7 @@
           <a:p>
             <a:fld id="{6E86E93E-9FC2-4E2D-B23B-44D3A41FB4D3}" type="datetimeFigureOut">
               <a:rPr lang="zh-CN" altLang="en-US" smtClean="0"/>
-              <a:t>2023/4/30</a:t>
+              <a:t>2023/5/1</a:t>
             </a:fld>
             <a:endParaRPr lang="zh-CN" altLang="en-US"/>
           </a:p>
@@ -1831,7 +1831,7 @@
           <a:p>
             <a:fld id="{6E86E93E-9FC2-4E2D-B23B-44D3A41FB4D3}" type="datetimeFigureOut">
               <a:rPr lang="zh-CN" altLang="en-US" smtClean="0"/>
-              <a:t>2023/4/30</a:t>
+              <a:t>2023/5/1</a:t>
             </a:fld>
             <a:endParaRPr lang="zh-CN" altLang="en-US"/>
           </a:p>
@@ -1973,7 +1973,7 @@
           <a:p>
             <a:fld id="{6E86E93E-9FC2-4E2D-B23B-44D3A41FB4D3}" type="datetimeFigureOut">
               <a:rPr lang="zh-CN" altLang="en-US" smtClean="0"/>
-              <a:t>2023/4/30</a:t>
+              <a:t>2023/5/1</a:t>
             </a:fld>
             <a:endParaRPr lang="zh-CN" altLang="en-US"/>
           </a:p>
@@ -2086,7 +2086,7 @@
           <a:p>
             <a:fld id="{6E86E93E-9FC2-4E2D-B23B-44D3A41FB4D3}" type="datetimeFigureOut">
               <a:rPr lang="zh-CN" altLang="en-US" smtClean="0"/>
-              <a:t>2023/4/30</a:t>
+              <a:t>2023/5/1</a:t>
             </a:fld>
             <a:endParaRPr lang="zh-CN" altLang="en-US"/>
           </a:p>
@@ -2399,7 +2399,7 @@
           <a:p>
             <a:fld id="{6E86E93E-9FC2-4E2D-B23B-44D3A41FB4D3}" type="datetimeFigureOut">
               <a:rPr lang="zh-CN" altLang="en-US" smtClean="0"/>
-              <a:t>2023/4/30</a:t>
+              <a:t>2023/5/1</a:t>
             </a:fld>
             <a:endParaRPr lang="zh-CN" altLang="en-US"/>
           </a:p>
@@ -2688,7 +2688,7 @@
           <a:p>
             <a:fld id="{6E86E93E-9FC2-4E2D-B23B-44D3A41FB4D3}" type="datetimeFigureOut">
               <a:rPr lang="zh-CN" altLang="en-US" smtClean="0"/>
-              <a:t>2023/4/30</a:t>
+              <a:t>2023/5/1</a:t>
             </a:fld>
             <a:endParaRPr lang="zh-CN" altLang="en-US"/>
           </a:p>
@@ -2931,7 +2931,7 @@
           <a:p>
             <a:fld id="{6E86E93E-9FC2-4E2D-B23B-44D3A41FB4D3}" type="datetimeFigureOut">
               <a:rPr lang="zh-CN" altLang="en-US" smtClean="0"/>
-              <a:t>2023/4/30</a:t>
+              <a:t>2023/5/1</a:t>
             </a:fld>
             <a:endParaRPr lang="zh-CN" altLang="en-US"/>
           </a:p>
@@ -7992,7 +7992,7 @@
             <a:r>
               <a:rPr lang="zh-CN" altLang="en-US" sz="2000" b="1">
                 <a:solidFill>
-                  <a:schemeClr val="tx1"/>
+                  <a:srgbClr val="FF0000"/>
                 </a:solidFill>
                 <a:latin typeface="微软雅黑" panose="020B0503020204020204" pitchFamily="34" charset="-122"/>
                 <a:ea typeface="微软雅黑" panose="020B0503020204020204" pitchFamily="34" charset="-122"/>
@@ -8176,7 +8176,7 @@
             <a:r>
               <a:rPr lang="zh-CN" altLang="en-US" sz="2000" b="1">
                 <a:solidFill>
-                  <a:schemeClr val="tx1"/>
+                  <a:srgbClr val="FF0000"/>
                 </a:solidFill>
                 <a:latin typeface="微软雅黑" panose="020B0503020204020204" pitchFamily="34" charset="-122"/>
                 <a:ea typeface="微软雅黑" panose="020B0503020204020204" pitchFamily="34" charset="-122"/>
@@ -8201,7 +8201,7 @@
         <p:spPr>
           <a:xfrm>
             <a:off x="3128566" y="6347840"/>
-            <a:ext cx="1375611" cy="369332"/>
+            <a:ext cx="906725" cy="369332"/>
           </a:xfrm>
           <a:prstGeom prst="rect">
             <a:avLst/>
@@ -8229,10 +8229,10 @@
       </p:sp>
       <p:sp>
         <p:nvSpPr>
-          <p:cNvPr id="19" name="Rectangle: Rounded Corners 18">
-            <a:extLst>
-              <a:ext uri="{FF2B5EF4-FFF2-40B4-BE49-F238E27FC236}">
-                <a16:creationId xmlns:a16="http://schemas.microsoft.com/office/drawing/2014/main" id="{59D9056D-3DD1-7CEC-4B9E-914C4AC29010}"/>
+          <p:cNvPr id="10" name="Rectangle: Rounded Corners 9">
+            <a:extLst>
+              <a:ext uri="{FF2B5EF4-FFF2-40B4-BE49-F238E27FC236}">
+                <a16:creationId xmlns:a16="http://schemas.microsoft.com/office/drawing/2014/main" id="{12F34EDE-9685-BDEC-3601-D577DFAD1C4F}"/>
               </a:ext>
             </a:extLst>
           </p:cNvPr>
@@ -8241,7 +8241,543 @@
         </p:nvSpPr>
         <p:spPr>
           <a:xfrm>
-            <a:off x="11253964" y="4684822"/>
+            <a:off x="10457405" y="3438468"/>
+            <a:ext cx="430029" cy="422021"/>
+          </a:xfrm>
+          <a:prstGeom prst="roundRect">
+            <a:avLst>
+              <a:gd name="adj" fmla="val 50000"/>
+            </a:avLst>
+          </a:prstGeom>
+          <a:gradFill flip="none" rotWithShape="1">
+            <a:gsLst>
+              <a:gs pos="0">
+                <a:schemeClr val="accent4">
+                  <a:lumMod val="40000"/>
+                  <a:lumOff val="60000"/>
+                </a:schemeClr>
+              </a:gs>
+              <a:gs pos="46000">
+                <a:schemeClr val="accent4">
+                  <a:lumMod val="95000"/>
+                  <a:lumOff val="5000"/>
+                </a:schemeClr>
+              </a:gs>
+              <a:gs pos="100000">
+                <a:schemeClr val="accent4">
+                  <a:lumMod val="60000"/>
+                </a:schemeClr>
+              </a:gs>
+            </a:gsLst>
+            <a:path path="circle">
+              <a:fillToRect l="50000" t="130000" r="50000" b="-30000"/>
+            </a:path>
+            <a:tileRect/>
+          </a:gradFill>
+          <a:ln w="38100">
+            <a:noFill/>
+          </a:ln>
+          <a:effectLst>
+            <a:outerShdw blurRad="50800" dist="38100" dir="2700000" algn="tl" rotWithShape="0">
+              <a:prstClr val="black">
+                <a:alpha val="40000"/>
+              </a:prstClr>
+            </a:outerShdw>
+          </a:effectLst>
+        </p:spPr>
+        <p:style>
+          <a:lnRef idx="2">
+            <a:schemeClr val="accent1">
+              <a:shade val="50000"/>
+            </a:schemeClr>
+          </a:lnRef>
+          <a:fillRef idx="1">
+            <a:schemeClr val="accent1"/>
+          </a:fillRef>
+          <a:effectRef idx="0">
+            <a:schemeClr val="accent1"/>
+          </a:effectRef>
+          <a:fontRef idx="minor">
+            <a:schemeClr val="lt1"/>
+          </a:fontRef>
+        </p:style>
+        <p:txBody>
+          <a:bodyPr rtlCol="0" anchor="ctr"/>
+          <a:lstStyle/>
+          <a:p>
+            <a:pPr algn="ctr"/>
+            <a:r>
+              <a:rPr lang="zh-CN" altLang="en-US" sz="2000" b="1">
+                <a:solidFill>
+                  <a:schemeClr val="tx1"/>
+                </a:solidFill>
+                <a:latin typeface="微软雅黑" panose="020B0503020204020204" pitchFamily="34" charset="-122"/>
+                <a:ea typeface="微软雅黑" panose="020B0503020204020204" pitchFamily="34" charset="-122"/>
+              </a:rPr>
+              <a:t>♠</a:t>
+            </a:r>
+          </a:p>
+        </p:txBody>
+      </p:sp>
+      <p:sp>
+        <p:nvSpPr>
+          <p:cNvPr id="11" name="Rectangle: Rounded Corners 10">
+            <a:extLst>
+              <a:ext uri="{FF2B5EF4-FFF2-40B4-BE49-F238E27FC236}">
+                <a16:creationId xmlns:a16="http://schemas.microsoft.com/office/drawing/2014/main" id="{971A2D96-7EF9-8B22-9B5E-E733ACCE02EE}"/>
+              </a:ext>
+            </a:extLst>
+          </p:cNvPr>
+          <p:cNvSpPr/>
+          <p:nvPr/>
+        </p:nvSpPr>
+        <p:spPr>
+          <a:xfrm>
+            <a:off x="10994174" y="3454570"/>
+            <a:ext cx="430029" cy="422021"/>
+          </a:xfrm>
+          <a:prstGeom prst="roundRect">
+            <a:avLst>
+              <a:gd name="adj" fmla="val 50000"/>
+            </a:avLst>
+          </a:prstGeom>
+          <a:gradFill flip="none" rotWithShape="1">
+            <a:gsLst>
+              <a:gs pos="0">
+                <a:schemeClr val="accent4">
+                  <a:lumMod val="40000"/>
+                  <a:lumOff val="60000"/>
+                </a:schemeClr>
+              </a:gs>
+              <a:gs pos="46000">
+                <a:schemeClr val="accent4">
+                  <a:lumMod val="95000"/>
+                  <a:lumOff val="5000"/>
+                </a:schemeClr>
+              </a:gs>
+              <a:gs pos="100000">
+                <a:schemeClr val="accent4">
+                  <a:lumMod val="60000"/>
+                </a:schemeClr>
+              </a:gs>
+            </a:gsLst>
+            <a:path path="circle">
+              <a:fillToRect l="50000" t="130000" r="50000" b="-30000"/>
+            </a:path>
+            <a:tileRect/>
+          </a:gradFill>
+          <a:ln w="38100">
+            <a:noFill/>
+          </a:ln>
+          <a:effectLst>
+            <a:outerShdw blurRad="50800" dist="38100" dir="2700000" algn="tl" rotWithShape="0">
+              <a:prstClr val="black">
+                <a:alpha val="40000"/>
+              </a:prstClr>
+            </a:outerShdw>
+          </a:effectLst>
+        </p:spPr>
+        <p:style>
+          <a:lnRef idx="2">
+            <a:schemeClr val="accent1">
+              <a:shade val="50000"/>
+            </a:schemeClr>
+          </a:lnRef>
+          <a:fillRef idx="1">
+            <a:schemeClr val="accent1"/>
+          </a:fillRef>
+          <a:effectRef idx="0">
+            <a:schemeClr val="accent1"/>
+          </a:effectRef>
+          <a:fontRef idx="minor">
+            <a:schemeClr val="lt1"/>
+          </a:fontRef>
+        </p:style>
+        <p:txBody>
+          <a:bodyPr rtlCol="0" anchor="ctr"/>
+          <a:lstStyle/>
+          <a:p>
+            <a:pPr algn="ctr"/>
+            <a:r>
+              <a:rPr lang="zh-CN" altLang="en-US" sz="2000" b="1">
+                <a:solidFill>
+                  <a:srgbClr val="FF0000"/>
+                </a:solidFill>
+                <a:latin typeface="微软雅黑" panose="020B0503020204020204" pitchFamily="34" charset="-122"/>
+                <a:ea typeface="微软雅黑" panose="020B0503020204020204" pitchFamily="34" charset="-122"/>
+              </a:rPr>
+              <a:t>♥</a:t>
+            </a:r>
+          </a:p>
+        </p:txBody>
+      </p:sp>
+      <p:sp>
+        <p:nvSpPr>
+          <p:cNvPr id="23" name="Rectangle: Rounded Corners 22">
+            <a:extLst>
+              <a:ext uri="{FF2B5EF4-FFF2-40B4-BE49-F238E27FC236}">
+                <a16:creationId xmlns:a16="http://schemas.microsoft.com/office/drawing/2014/main" id="{4305E8DB-FC5B-D891-C0DC-AEBD98172725}"/>
+              </a:ext>
+            </a:extLst>
+          </p:cNvPr>
+          <p:cNvSpPr/>
+          <p:nvPr/>
+        </p:nvSpPr>
+        <p:spPr>
+          <a:xfrm>
+            <a:off x="11530943" y="3464022"/>
+            <a:ext cx="430029" cy="422021"/>
+          </a:xfrm>
+          <a:prstGeom prst="roundRect">
+            <a:avLst>
+              <a:gd name="adj" fmla="val 50000"/>
+            </a:avLst>
+          </a:prstGeom>
+          <a:gradFill flip="none" rotWithShape="1">
+            <a:gsLst>
+              <a:gs pos="0">
+                <a:schemeClr val="accent4">
+                  <a:lumMod val="40000"/>
+                  <a:lumOff val="60000"/>
+                </a:schemeClr>
+              </a:gs>
+              <a:gs pos="46000">
+                <a:schemeClr val="accent4">
+                  <a:lumMod val="95000"/>
+                  <a:lumOff val="5000"/>
+                </a:schemeClr>
+              </a:gs>
+              <a:gs pos="100000">
+                <a:schemeClr val="accent4">
+                  <a:lumMod val="60000"/>
+                </a:schemeClr>
+              </a:gs>
+            </a:gsLst>
+            <a:path path="circle">
+              <a:fillToRect l="50000" t="130000" r="50000" b="-30000"/>
+            </a:path>
+            <a:tileRect/>
+          </a:gradFill>
+          <a:ln w="38100">
+            <a:noFill/>
+          </a:ln>
+          <a:effectLst>
+            <a:outerShdw blurRad="50800" dist="38100" dir="2700000" algn="tl" rotWithShape="0">
+              <a:prstClr val="black">
+                <a:alpha val="40000"/>
+              </a:prstClr>
+            </a:outerShdw>
+          </a:effectLst>
+        </p:spPr>
+        <p:style>
+          <a:lnRef idx="2">
+            <a:schemeClr val="accent1">
+              <a:shade val="50000"/>
+            </a:schemeClr>
+          </a:lnRef>
+          <a:fillRef idx="1">
+            <a:schemeClr val="accent1"/>
+          </a:fillRef>
+          <a:effectRef idx="0">
+            <a:schemeClr val="accent1"/>
+          </a:effectRef>
+          <a:fontRef idx="minor">
+            <a:schemeClr val="lt1"/>
+          </a:fontRef>
+        </p:style>
+        <p:txBody>
+          <a:bodyPr rtlCol="0" anchor="ctr"/>
+          <a:lstStyle/>
+          <a:p>
+            <a:pPr algn="ctr"/>
+            <a:r>
+              <a:rPr lang="zh-CN" altLang="en-US" sz="2000" b="1">
+                <a:solidFill>
+                  <a:schemeClr val="tx1"/>
+                </a:solidFill>
+                <a:latin typeface="微软雅黑" panose="020B0503020204020204" pitchFamily="34" charset="-122"/>
+                <a:ea typeface="微软雅黑" panose="020B0503020204020204" pitchFamily="34" charset="-122"/>
+              </a:rPr>
+              <a:t>♣</a:t>
+            </a:r>
+          </a:p>
+        </p:txBody>
+      </p:sp>
+      <p:sp>
+        <p:nvSpPr>
+          <p:cNvPr id="24" name="Rectangle: Rounded Corners 23">
+            <a:extLst>
+              <a:ext uri="{FF2B5EF4-FFF2-40B4-BE49-F238E27FC236}">
+                <a16:creationId xmlns:a16="http://schemas.microsoft.com/office/drawing/2014/main" id="{3BFBDF6B-4315-BB37-78FA-66F8BB517B6A}"/>
+              </a:ext>
+            </a:extLst>
+          </p:cNvPr>
+          <p:cNvSpPr/>
+          <p:nvPr/>
+        </p:nvSpPr>
+        <p:spPr>
+          <a:xfrm>
+            <a:off x="12068343" y="3464022"/>
+            <a:ext cx="430029" cy="422021"/>
+          </a:xfrm>
+          <a:prstGeom prst="roundRect">
+            <a:avLst>
+              <a:gd name="adj" fmla="val 50000"/>
+            </a:avLst>
+          </a:prstGeom>
+          <a:gradFill flip="none" rotWithShape="1">
+            <a:gsLst>
+              <a:gs pos="0">
+                <a:schemeClr val="accent4">
+                  <a:lumMod val="40000"/>
+                  <a:lumOff val="60000"/>
+                </a:schemeClr>
+              </a:gs>
+              <a:gs pos="46000">
+                <a:schemeClr val="accent4">
+                  <a:lumMod val="95000"/>
+                  <a:lumOff val="5000"/>
+                </a:schemeClr>
+              </a:gs>
+              <a:gs pos="100000">
+                <a:schemeClr val="accent4">
+                  <a:lumMod val="60000"/>
+                </a:schemeClr>
+              </a:gs>
+            </a:gsLst>
+            <a:path path="circle">
+              <a:fillToRect l="50000" t="130000" r="50000" b="-30000"/>
+            </a:path>
+            <a:tileRect/>
+          </a:gradFill>
+          <a:ln w="38100">
+            <a:noFill/>
+          </a:ln>
+          <a:effectLst>
+            <a:outerShdw blurRad="50800" dist="38100" dir="2700000" algn="tl" rotWithShape="0">
+              <a:prstClr val="black">
+                <a:alpha val="40000"/>
+              </a:prstClr>
+            </a:outerShdw>
+          </a:effectLst>
+        </p:spPr>
+        <p:style>
+          <a:lnRef idx="2">
+            <a:schemeClr val="accent1">
+              <a:shade val="50000"/>
+            </a:schemeClr>
+          </a:lnRef>
+          <a:fillRef idx="1">
+            <a:schemeClr val="accent1"/>
+          </a:fillRef>
+          <a:effectRef idx="0">
+            <a:schemeClr val="accent1"/>
+          </a:effectRef>
+          <a:fontRef idx="minor">
+            <a:schemeClr val="lt1"/>
+          </a:fontRef>
+        </p:style>
+        <p:txBody>
+          <a:bodyPr rtlCol="0" anchor="ctr"/>
+          <a:lstStyle/>
+          <a:p>
+            <a:pPr algn="ctr"/>
+            <a:r>
+              <a:rPr lang="zh-CN" altLang="en-US" sz="2000" b="1">
+                <a:solidFill>
+                  <a:srgbClr val="FF0000"/>
+                </a:solidFill>
+                <a:latin typeface="微软雅黑" panose="020B0503020204020204" pitchFamily="34" charset="-122"/>
+                <a:ea typeface="微软雅黑" panose="020B0503020204020204" pitchFamily="34" charset="-122"/>
+              </a:rPr>
+              <a:t>♦</a:t>
+            </a:r>
+          </a:p>
+        </p:txBody>
+      </p:sp>
+      <p:sp>
+        <p:nvSpPr>
+          <p:cNvPr id="25" name="Rectangle: Rounded Corners 24">
+            <a:extLst>
+              <a:ext uri="{FF2B5EF4-FFF2-40B4-BE49-F238E27FC236}">
+                <a16:creationId xmlns:a16="http://schemas.microsoft.com/office/drawing/2014/main" id="{B312B571-A2F5-854D-7220-C494145CBA25}"/>
+              </a:ext>
+            </a:extLst>
+          </p:cNvPr>
+          <p:cNvSpPr/>
+          <p:nvPr/>
+        </p:nvSpPr>
+        <p:spPr>
+          <a:xfrm>
+            <a:off x="10453715" y="4057628"/>
+            <a:ext cx="430029" cy="422021"/>
+          </a:xfrm>
+          <a:prstGeom prst="roundRect">
+            <a:avLst>
+              <a:gd name="adj" fmla="val 50000"/>
+            </a:avLst>
+          </a:prstGeom>
+          <a:ln/>
+        </p:spPr>
+        <p:style>
+          <a:lnRef idx="0">
+            <a:schemeClr val="accent3"/>
+          </a:lnRef>
+          <a:fillRef idx="3">
+            <a:schemeClr val="accent3"/>
+          </a:fillRef>
+          <a:effectRef idx="3">
+            <a:schemeClr val="accent3"/>
+          </a:effectRef>
+          <a:fontRef idx="minor">
+            <a:schemeClr val="lt1"/>
+          </a:fontRef>
+        </p:style>
+        <p:txBody>
+          <a:bodyPr rtlCol="0" anchor="ctr"/>
+          <a:lstStyle/>
+          <a:p>
+            <a:pPr algn="ctr"/>
+            <a:r>
+              <a:rPr lang="zh-CN" altLang="en-US" sz="2000" b="1">
+                <a:solidFill>
+                  <a:schemeClr val="tx1"/>
+                </a:solidFill>
+                <a:latin typeface="微软雅黑" panose="020B0503020204020204" pitchFamily="34" charset="-122"/>
+                <a:ea typeface="微软雅黑" panose="020B0503020204020204" pitchFamily="34" charset="-122"/>
+              </a:rPr>
+              <a:t>♠</a:t>
+            </a:r>
+          </a:p>
+        </p:txBody>
+      </p:sp>
+      <p:sp>
+        <p:nvSpPr>
+          <p:cNvPr id="26" name="Rectangle: Rounded Corners 25">
+            <a:extLst>
+              <a:ext uri="{FF2B5EF4-FFF2-40B4-BE49-F238E27FC236}">
+                <a16:creationId xmlns:a16="http://schemas.microsoft.com/office/drawing/2014/main" id="{796B6639-0B79-E5EB-A116-D62561AB8239}"/>
+              </a:ext>
+            </a:extLst>
+          </p:cNvPr>
+          <p:cNvSpPr/>
+          <p:nvPr/>
+        </p:nvSpPr>
+        <p:spPr>
+          <a:xfrm>
+            <a:off x="10990484" y="4073730"/>
+            <a:ext cx="430029" cy="422021"/>
+          </a:xfrm>
+          <a:prstGeom prst="roundRect">
+            <a:avLst>
+              <a:gd name="adj" fmla="val 50000"/>
+            </a:avLst>
+          </a:prstGeom>
+          <a:ln/>
+        </p:spPr>
+        <p:style>
+          <a:lnRef idx="0">
+            <a:schemeClr val="accent3"/>
+          </a:lnRef>
+          <a:fillRef idx="3">
+            <a:schemeClr val="accent3"/>
+          </a:fillRef>
+          <a:effectRef idx="3">
+            <a:schemeClr val="accent3"/>
+          </a:effectRef>
+          <a:fontRef idx="minor">
+            <a:schemeClr val="lt1"/>
+          </a:fontRef>
+        </p:style>
+        <p:txBody>
+          <a:bodyPr rtlCol="0" anchor="ctr"/>
+          <a:lstStyle/>
+          <a:p>
+            <a:pPr algn="ctr"/>
+            <a:r>
+              <a:rPr lang="zh-CN" altLang="en-US" sz="2000" b="1">
+                <a:solidFill>
+                  <a:schemeClr val="tx1"/>
+                </a:solidFill>
+                <a:latin typeface="微软雅黑" panose="020B0503020204020204" pitchFamily="34" charset="-122"/>
+                <a:ea typeface="微软雅黑" panose="020B0503020204020204" pitchFamily="34" charset="-122"/>
+              </a:rPr>
+              <a:t>♥</a:t>
+            </a:r>
+          </a:p>
+        </p:txBody>
+      </p:sp>
+      <p:sp>
+        <p:nvSpPr>
+          <p:cNvPr id="27" name="Rectangle: Rounded Corners 26">
+            <a:extLst>
+              <a:ext uri="{FF2B5EF4-FFF2-40B4-BE49-F238E27FC236}">
+                <a16:creationId xmlns:a16="http://schemas.microsoft.com/office/drawing/2014/main" id="{4FDF8FAF-4339-610B-896C-A6805BD07CD7}"/>
+              </a:ext>
+            </a:extLst>
+          </p:cNvPr>
+          <p:cNvSpPr/>
+          <p:nvPr/>
+        </p:nvSpPr>
+        <p:spPr>
+          <a:xfrm>
+            <a:off x="11527253" y="4083182"/>
+            <a:ext cx="430029" cy="422021"/>
+          </a:xfrm>
+          <a:prstGeom prst="roundRect">
+            <a:avLst>
+              <a:gd name="adj" fmla="val 50000"/>
+            </a:avLst>
+          </a:prstGeom>
+          <a:ln/>
+        </p:spPr>
+        <p:style>
+          <a:lnRef idx="0">
+            <a:schemeClr val="accent3"/>
+          </a:lnRef>
+          <a:fillRef idx="3">
+            <a:schemeClr val="accent3"/>
+          </a:fillRef>
+          <a:effectRef idx="3">
+            <a:schemeClr val="accent3"/>
+          </a:effectRef>
+          <a:fontRef idx="minor">
+            <a:schemeClr val="lt1"/>
+          </a:fontRef>
+        </p:style>
+        <p:txBody>
+          <a:bodyPr rtlCol="0" anchor="ctr"/>
+          <a:lstStyle/>
+          <a:p>
+            <a:pPr algn="ctr"/>
+            <a:r>
+              <a:rPr lang="zh-CN" altLang="en-US" sz="2000" b="1">
+                <a:solidFill>
+                  <a:schemeClr val="tx1"/>
+                </a:solidFill>
+                <a:latin typeface="微软雅黑" panose="020B0503020204020204" pitchFamily="34" charset="-122"/>
+                <a:ea typeface="微软雅黑" panose="020B0503020204020204" pitchFamily="34" charset="-122"/>
+              </a:rPr>
+              <a:t>♣</a:t>
+            </a:r>
+          </a:p>
+        </p:txBody>
+      </p:sp>
+      <p:sp>
+        <p:nvSpPr>
+          <p:cNvPr id="28" name="Rectangle: Rounded Corners 27">
+            <a:extLst>
+              <a:ext uri="{FF2B5EF4-FFF2-40B4-BE49-F238E27FC236}">
+                <a16:creationId xmlns:a16="http://schemas.microsoft.com/office/drawing/2014/main" id="{4039D269-17D4-DFFF-048F-64A33F081F7F}"/>
+              </a:ext>
+            </a:extLst>
+          </p:cNvPr>
+          <p:cNvSpPr/>
+          <p:nvPr/>
+        </p:nvSpPr>
+        <p:spPr>
+          <a:xfrm>
+            <a:off x="12064653" y="4083182"/>
             <a:ext cx="430029" cy="422021"/>
           </a:xfrm>
           <a:prstGeom prst="roundRect">

</xml_diff>